<commit_message>
Update presentation et note methologique
</commit_message>
<xml_diff>
--- a/Présentation/Sylla_Mahamadou_4_Presentation_072022.pptx
+++ b/Présentation/Sylla_Mahamadou_4_Presentation_072022.pptx
@@ -5663,7 +5663,7 @@
       <dgm:spPr/>
     </dgm:pt>
     <dgm:pt modelId="{798B20FC-DEC5-4C26-8A43-743E1086666F}" type="pres">
-      <dgm:prSet presAssocID="{C1E487EA-23F2-4DD2-8609-58C6C1FE48BB}" presName="firstChild" presStyleLbl="bgAccFollowNode1" presStyleIdx="0" presStyleCnt="3" custScaleY="110859"/>
+      <dgm:prSet presAssocID="{C1E487EA-23F2-4DD2-8609-58C6C1FE48BB}" presName="firstChild" presStyleLbl="bgAccFollowNode1" presStyleIdx="0" presStyleCnt="3" custScaleY="110859" custLinFactNeighborX="-912" custLinFactNeighborY="-553"/>
       <dgm:spPr/>
     </dgm:pt>
     <dgm:pt modelId="{B3F14EFF-0C5D-4D22-8D56-8CFD789326DC}" type="pres">
@@ -7540,7 +7540,7 @@
       </dsp:nvSpPr>
       <dsp:spPr>
         <a:xfrm>
-          <a:off x="2104532" y="789403"/>
+          <a:off x="2077629" y="778522"/>
           <a:ext cx="2949884" cy="2181231"/>
         </a:xfrm>
         <a:prstGeom prst="rect">
@@ -7671,7 +7671,7 @@
         </a:p>
       </dsp:txBody>
       <dsp:txXfrm>
-        <a:off x="2576514" y="789403"/>
+        <a:off x="2549611" y="778522"/>
         <a:ext cx="2477902" cy="2181231"/>
       </dsp:txXfrm>
     </dsp:sp>
@@ -16890,7 +16890,7 @@
             <a:pPr rtl="0"/>
             <a:fld id="{F2641A86-FBF4-4831-9FF4-7B487F3492D7}" type="datetime1">
               <a:rPr lang="fr-FR" smtClean="0"/>
-              <a:t>20/09/2022</a:t>
+              <a:t>26/09/2022</a:t>
             </a:fld>
             <a:endParaRPr lang="en-US" dirty="0"/>
           </a:p>
@@ -17060,7 +17060,7 @@
             <a:pPr rtl="0"/>
             <a:fld id="{1713F8BB-B1B5-4D35-A08C-A275931309FC}" type="datetime1">
               <a:rPr lang="fr-FR" smtClean="0"/>
-              <a:t>20/09/2022</a:t>
+              <a:t>26/09/2022</a:t>
             </a:fld>
             <a:endParaRPr lang="en-US"/>
           </a:p>
@@ -17522,7 +17522,7 @@
             <a:pPr rtl="0"/>
             <a:fld id="{EABA18A1-B72F-49DD-8A51-DC4A9B10C77C}" type="datetime1">
               <a:rPr lang="fr-FR" smtClean="0"/>
-              <a:t>20/09/2022</a:t>
+              <a:t>26/09/2022</a:t>
             </a:fld>
             <a:endParaRPr lang="en-US" dirty="0"/>
           </a:p>
@@ -17863,7 +17863,7 @@
             <a:pPr rtl="0"/>
             <a:fld id="{33CD2423-DC0C-47A2-8916-10643EB35EC9}" type="datetime1">
               <a:rPr lang="fr-FR" smtClean="0"/>
-              <a:t>20/09/2022</a:t>
+              <a:t>26/09/2022</a:t>
             </a:fld>
             <a:endParaRPr lang="en-US" dirty="0"/>
           </a:p>
@@ -18268,7 +18268,7 @@
             <a:pPr rtl="0"/>
             <a:fld id="{33CD2423-DC0C-47A2-8916-10643EB35EC9}" type="datetime1">
               <a:rPr lang="fr-FR" smtClean="0"/>
-              <a:t>20/09/2022</a:t>
+              <a:t>26/09/2022</a:t>
             </a:fld>
             <a:endParaRPr lang="en-US" dirty="0"/>
           </a:p>
@@ -18607,7 +18607,7 @@
             <a:pPr rtl="0"/>
             <a:fld id="{33CD2423-DC0C-47A2-8916-10643EB35EC9}" type="datetime1">
               <a:rPr lang="fr-FR" smtClean="0"/>
-              <a:t>20/09/2022</a:t>
+              <a:t>26/09/2022</a:t>
             </a:fld>
             <a:endParaRPr lang="en-US" dirty="0"/>
           </a:p>
@@ -18931,7 +18931,7 @@
             <a:pPr rtl="0"/>
             <a:fld id="{33CD2423-DC0C-47A2-8916-10643EB35EC9}" type="datetime1">
               <a:rPr lang="fr-FR" smtClean="0"/>
-              <a:t>20/09/2022</a:t>
+              <a:t>26/09/2022</a:t>
             </a:fld>
             <a:endParaRPr lang="en-US" dirty="0"/>
           </a:p>
@@ -19331,7 +19331,7 @@
             <a:pPr rtl="0"/>
             <a:fld id="{33CD2423-DC0C-47A2-8916-10643EB35EC9}" type="datetime1">
               <a:rPr lang="fr-FR" smtClean="0"/>
-              <a:t>20/09/2022</a:t>
+              <a:t>26/09/2022</a:t>
             </a:fld>
             <a:endParaRPr lang="en-US" dirty="0"/>
           </a:p>
@@ -19592,7 +19592,7 @@
             <a:pPr rtl="0"/>
             <a:fld id="{97A74DDF-14B3-4359-B246-DC1DC867FD8F}" type="datetime1">
               <a:rPr lang="fr-FR" smtClean="0"/>
-              <a:t>20/09/2022</a:t>
+              <a:t>26/09/2022</a:t>
             </a:fld>
             <a:endParaRPr lang="en-US" dirty="0"/>
           </a:p>
@@ -19857,7 +19857,7 @@
             <a:pPr rtl="0"/>
             <a:fld id="{72DB94D9-FA33-4622-B5B0-3A212B55AFC9}" type="datetime1">
               <a:rPr lang="fr-FR" smtClean="0"/>
-              <a:t>20/09/2022</a:t>
+              <a:t>26/09/2022</a:t>
             </a:fld>
             <a:endParaRPr lang="en-US" dirty="0"/>
           </a:p>
@@ -20122,7 +20122,7 @@
             <a:pPr rtl="0"/>
             <a:fld id="{75162FBC-E467-46B8-ABE1-98D95CFF2BA6}" type="datetime1">
               <a:rPr lang="fr-FR" smtClean="0"/>
-              <a:t>20/09/2022</a:t>
+              <a:t>26/09/2022</a:t>
             </a:fld>
             <a:endParaRPr lang="en-US" dirty="0"/>
           </a:p>
@@ -20454,7 +20454,7 @@
             <a:pPr rtl="0"/>
             <a:fld id="{33CD2423-DC0C-47A2-8916-10643EB35EC9}" type="datetime1">
               <a:rPr lang="fr-FR" smtClean="0"/>
-              <a:t>20/09/2022</a:t>
+              <a:t>26/09/2022</a:t>
             </a:fld>
             <a:endParaRPr lang="en-US" dirty="0"/>
           </a:p>
@@ -20781,7 +20781,7 @@
             <a:pPr rtl="0"/>
             <a:fld id="{F810B38C-D4F5-42C2-967A-0B7FC97B2621}" type="datetime1">
               <a:rPr lang="fr-FR" smtClean="0"/>
-              <a:t>20/09/2022</a:t>
+              <a:t>26/09/2022</a:t>
             </a:fld>
             <a:endParaRPr lang="en-US" dirty="0"/>
           </a:p>
@@ -21241,7 +21241,7 @@
             <a:pPr rtl="0"/>
             <a:fld id="{76C9646D-2F82-4FD6-98A1-C2A4C26D0529}" type="datetime1">
               <a:rPr lang="fr-FR" smtClean="0"/>
-              <a:t>20/09/2022</a:t>
+              <a:t>26/09/2022</a:t>
             </a:fld>
             <a:endParaRPr lang="en-US" dirty="0"/>
           </a:p>
@@ -21449,7 +21449,7 @@
             <a:pPr rtl="0"/>
             <a:fld id="{33CD2423-DC0C-47A2-8916-10643EB35EC9}" type="datetime1">
               <a:rPr lang="fr-FR" smtClean="0"/>
-              <a:t>20/09/2022</a:t>
+              <a:t>26/09/2022</a:t>
             </a:fld>
             <a:endParaRPr lang="en-US" dirty="0"/>
           </a:p>
@@ -21630,7 +21630,7 @@
             <a:pPr rtl="0"/>
             <a:fld id="{8C7E81F3-FFCD-4236-B158-26C78CAC6E11}" type="datetime1">
               <a:rPr lang="fr-FR" smtClean="0"/>
-              <a:t>20/09/2022</a:t>
+              <a:t>26/09/2022</a:t>
             </a:fld>
             <a:endParaRPr lang="en-US" dirty="0"/>
           </a:p>
@@ -21966,7 +21966,7 @@
             <a:pPr rtl="0"/>
             <a:fld id="{0A97361A-7C50-452A-9761-2F2CCDC29838}" type="datetime1">
               <a:rPr lang="fr-FR" smtClean="0"/>
-              <a:t>20/09/2022</a:t>
+              <a:t>26/09/2022</a:t>
             </a:fld>
             <a:endParaRPr lang="en-US" dirty="0"/>
           </a:p>
@@ -22315,7 +22315,7 @@
             <a:pPr rtl="0"/>
             <a:fld id="{7E208F8F-9785-4D7E-B2D7-6FB9149CAF24}" type="datetime1">
               <a:rPr lang="fr-FR" smtClean="0"/>
-              <a:t>20/09/2022</a:t>
+              <a:t>26/09/2022</a:t>
             </a:fld>
             <a:endParaRPr lang="en-US" dirty="0"/>
           </a:p>
@@ -24435,7 +24435,7 @@
             <a:pPr rtl="0"/>
             <a:fld id="{33CD2423-DC0C-47A2-8916-10643EB35EC9}" type="datetime1">
               <a:rPr lang="fr-FR" smtClean="0"/>
-              <a:t>20/09/2022</a:t>
+              <a:t>26/09/2022</a:t>
             </a:fld>
             <a:endParaRPr lang="en-US" dirty="0"/>
           </a:p>
@@ -25235,7 +25235,7 @@
             <a:pPr rtl="0"/>
             <a:fld id="{33CD2423-DC0C-47A2-8916-10643EB35EC9}" type="datetime1">
               <a:rPr lang="fr-FR" smtClean="0"/>
-              <a:t>20/09/2022</a:t>
+              <a:t>26/09/2022</a:t>
             </a:fld>
             <a:endParaRPr lang="en-US" dirty="0"/>
           </a:p>
@@ -25412,7 +25412,7 @@
             <a:pPr rtl="0"/>
             <a:fld id="{33CD2423-DC0C-47A2-8916-10643EB35EC9}" type="datetime1">
               <a:rPr lang="fr-FR" smtClean="0"/>
-              <a:t>20/09/2022</a:t>
+              <a:t>26/09/2022</a:t>
             </a:fld>
             <a:endParaRPr lang="en-US" dirty="0"/>
           </a:p>
@@ -25625,7 +25625,7 @@
             <a:pPr rtl="0"/>
             <a:fld id="{33CD2423-DC0C-47A2-8916-10643EB35EC9}" type="datetime1">
               <a:rPr lang="fr-FR" smtClean="0"/>
-              <a:t>20/09/2022</a:t>
+              <a:t>26/09/2022</a:t>
             </a:fld>
             <a:endParaRPr lang="en-US" dirty="0"/>
           </a:p>
@@ -25882,7 +25882,7 @@
             <a:pPr rtl="0"/>
             <a:fld id="{33CD2423-DC0C-47A2-8916-10643EB35EC9}" type="datetime1">
               <a:rPr lang="fr-FR" smtClean="0"/>
-              <a:t>20/09/2022</a:t>
+              <a:t>26/09/2022</a:t>
             </a:fld>
             <a:endParaRPr lang="en-US" dirty="0"/>
           </a:p>
@@ -26162,7 +26162,7 @@
             <a:pPr rtl="0"/>
             <a:fld id="{33CD2423-DC0C-47A2-8916-10643EB35EC9}" type="datetime1">
               <a:rPr lang="fr-FR" smtClean="0"/>
-              <a:t>20/09/2022</a:t>
+              <a:t>26/09/2022</a:t>
             </a:fld>
             <a:endParaRPr lang="en-US" dirty="0"/>
           </a:p>
@@ -26274,7 +26274,7 @@
             <a:pPr rtl="0"/>
             <a:fld id="{33CD2423-DC0C-47A2-8916-10643EB35EC9}" type="datetime1">
               <a:rPr lang="fr-FR" smtClean="0"/>
-              <a:t>20/09/2022</a:t>
+              <a:t>26/09/2022</a:t>
             </a:fld>
             <a:endParaRPr lang="en-US" dirty="0"/>
           </a:p>
@@ -26452,7 +26452,7 @@
             <a:pPr rtl="0"/>
             <a:fld id="{33CD2423-DC0C-47A2-8916-10643EB35EC9}" type="datetime1">
               <a:rPr lang="fr-FR" smtClean="0"/>
-              <a:t>20/09/2022</a:t>
+              <a:t>26/09/2022</a:t>
             </a:fld>
             <a:endParaRPr lang="en-US" dirty="0"/>
           </a:p>
@@ -26707,7 +26707,7 @@
             <a:pPr rtl="0"/>
             <a:fld id="{33CD2423-DC0C-47A2-8916-10643EB35EC9}" type="datetime1">
               <a:rPr lang="fr-FR" smtClean="0"/>
-              <a:t>20/09/2022</a:t>
+              <a:t>26/09/2022</a:t>
             </a:fld>
             <a:endParaRPr lang="en-US" dirty="0"/>
           </a:p>
@@ -27052,7 +27052,7 @@
             <a:pPr rtl="0"/>
             <a:fld id="{75162FBC-E467-46B8-ABE1-98D95CFF2BA6}" type="datetime1">
               <a:rPr lang="fr-FR" smtClean="0"/>
-              <a:t>20/09/2022</a:t>
+              <a:t>26/09/2022</a:t>
             </a:fld>
             <a:endParaRPr lang="en-US" dirty="0"/>
           </a:p>
@@ -27112,7 +27112,7 @@
             <a:pPr rtl="0"/>
             <a:fld id="{8C7E81F3-FFCD-4236-B158-26C78CAC6E11}" type="datetime1">
               <a:rPr lang="fr-FR" smtClean="0"/>
-              <a:t>20/09/2022</a:t>
+              <a:t>26/09/2022</a:t>
             </a:fld>
             <a:endParaRPr lang="en-US" dirty="0"/>
           </a:p>
@@ -27384,7 +27384,7 @@
             <a:pPr rtl="0"/>
             <a:fld id="{33CD2423-DC0C-47A2-8916-10643EB35EC9}" type="datetime1">
               <a:rPr lang="fr-FR" smtClean="0"/>
-              <a:t>20/09/2022</a:t>
+              <a:t>26/09/2022</a:t>
             </a:fld>
             <a:endParaRPr lang="en-US" dirty="0"/>
           </a:p>
@@ -27515,7 +27515,7 @@
             <a:pPr rtl="0"/>
             <a:fld id="{75162FBC-E467-46B8-ABE1-98D95CFF2BA6}" type="datetime1">
               <a:rPr lang="fr-FR" smtClean="0"/>
-              <a:t>20/09/2022</a:t>
+              <a:t>26/09/2022</a:t>
             </a:fld>
             <a:endParaRPr lang="en-US" dirty="0"/>
           </a:p>
@@ -27700,7 +27700,7 @@
             <a:pPr rtl="0"/>
             <a:fld id="{33CD2423-DC0C-47A2-8916-10643EB35EC9}" type="datetime1">
               <a:rPr lang="fr-FR" smtClean="0"/>
-              <a:t>20/09/2022</a:t>
+              <a:t>26/09/2022</a:t>
             </a:fld>
             <a:endParaRPr lang="en-US" dirty="0"/>
           </a:p>
@@ -27744,10 +27744,10 @@
       </p:pic>
       <p:pic>
         <p:nvPicPr>
-          <p:cNvPr id="10" name="Image 9">
+          <p:cNvPr id="6" name="Image 5">
             <a:extLst>
               <a:ext uri="{FF2B5EF4-FFF2-40B4-BE49-F238E27FC236}">
-                <a16:creationId xmlns:a16="http://schemas.microsoft.com/office/drawing/2014/main" id="{06F82AAE-6DA3-25B0-2BF7-B4E0F8EB5052}"/>
+                <a16:creationId xmlns:a16="http://schemas.microsoft.com/office/drawing/2014/main" id="{3B98AAF0-1C22-12EB-ADE6-266F55B14120}"/>
               </a:ext>
             </a:extLst>
           </p:cNvPr>
@@ -27770,8 +27770,8 @@
         </p:blipFill>
         <p:spPr>
           <a:xfrm>
-            <a:off x="10555942" y="1478775"/>
-            <a:ext cx="3055620" cy="3900450"/>
+            <a:off x="11201400" y="1478775"/>
+            <a:ext cx="2619741" cy="4315427"/>
           </a:xfrm>
           <a:prstGeom prst="rect">
             <a:avLst/>
@@ -27891,7 +27891,7 @@
             <a:pPr rtl="0"/>
             <a:fld id="{33CD2423-DC0C-47A2-8916-10643EB35EC9}" type="datetime1">
               <a:rPr lang="fr-FR" smtClean="0"/>
-              <a:t>20/09/2022</a:t>
+              <a:t>26/09/2022</a:t>
             </a:fld>
             <a:endParaRPr lang="en-US" dirty="0"/>
           </a:p>
@@ -28091,7 +28091,7 @@
             <a:pPr rtl="0"/>
             <a:fld id="{33CD2423-DC0C-47A2-8916-10643EB35EC9}" type="datetime1">
               <a:rPr lang="fr-FR" smtClean="0"/>
-              <a:t>20/09/2022</a:t>
+              <a:t>26/09/2022</a:t>
             </a:fld>
             <a:endParaRPr lang="en-US" dirty="0"/>
           </a:p>
@@ -28202,7 +28202,7 @@
             <a:pPr rtl="0"/>
             <a:fld id="{33CD2423-DC0C-47A2-8916-10643EB35EC9}" type="datetime1">
               <a:rPr lang="fr-FR" smtClean="0"/>
-              <a:t>20/09/2022</a:t>
+              <a:t>26/09/2022</a:t>
             </a:fld>
             <a:endParaRPr lang="en-US" dirty="0"/>
           </a:p>
@@ -28341,7 +28341,7 @@
             <a:pPr rtl="0"/>
             <a:fld id="{33CD2423-DC0C-47A2-8916-10643EB35EC9}" type="datetime1">
               <a:rPr lang="fr-FR" smtClean="0"/>
-              <a:t>20/09/2022</a:t>
+              <a:t>26/09/2022</a:t>
             </a:fld>
             <a:endParaRPr lang="en-US" dirty="0"/>
           </a:p>
@@ -28360,7 +28360,7 @@
           <p:nvPr>
             <p:extLst>
               <p:ext uri="{D42A27DB-BD31-4B8C-83A1-F6EECF244321}">
-                <p14:modId xmlns:p14="http://schemas.microsoft.com/office/powerpoint/2010/main" val="1809088111"/>
+                <p14:modId xmlns:p14="http://schemas.microsoft.com/office/powerpoint/2010/main" val="1484699441"/>
               </p:ext>
             </p:extLst>
           </p:nvPr>

</xml_diff>